<commit_message>
string buffer and builder
</commit_message>
<xml_diff>
--- a/PowerPoints/Modue_4/String_StringBuffer_StringBuilder.pptx
+++ b/PowerPoints/Modue_4/String_StringBuffer_StringBuilder.pptx
@@ -14,6 +14,8 @@
     <p:sldId id="263" r:id="rId8"/>
     <p:sldId id="265" r:id="rId9"/>
     <p:sldId id="264" r:id="rId10"/>
+    <p:sldId id="268" r:id="rId11"/>
+    <p:sldId id="267" r:id="rId12"/>
   </p:sldIdLst>
   <p:sldSz cx="9144000" cy="6858000" type="screen4x3"/>
   <p:notesSz cx="6858000" cy="9144000"/>
@@ -3172,6 +3174,245 @@
 </p:sld>
 </file>
 
+<file path=ppt/slides/slide10.xml><?xml version="1.0" encoding="utf-8"?>
+<p:sld xmlns:a="http://schemas.openxmlformats.org/drawingml/2006/main" xmlns:r="http://schemas.openxmlformats.org/officeDocument/2006/relationships" xmlns:p="http://schemas.openxmlformats.org/presentationml/2006/main">
+  <p:cSld>
+    <p:spTree>
+      <p:nvGrpSpPr>
+        <p:cNvPr id="1" name=""/>
+        <p:cNvGrpSpPr/>
+        <p:nvPr/>
+      </p:nvGrpSpPr>
+      <p:grpSpPr>
+        <a:xfrm>
+          <a:off x="0" y="0"/>
+          <a:ext cx="0" cy="0"/>
+          <a:chOff x="0" y="0"/>
+          <a:chExt cx="0" cy="0"/>
+        </a:xfrm>
+      </p:grpSpPr>
+      <p:sp>
+        <p:nvSpPr>
+          <p:cNvPr id="2" name="Title 1"/>
+          <p:cNvSpPr>
+            <a:spLocks noGrp="1"/>
+          </p:cNvSpPr>
+          <p:nvPr>
+            <p:ph type="title"/>
+          </p:nvPr>
+        </p:nvSpPr>
+        <p:spPr/>
+        <p:txBody>
+          <a:bodyPr/>
+          <a:lstStyle/>
+          <a:p>
+            <a:endParaRPr lang="en-US"/>
+          </a:p>
+        </p:txBody>
+      </p:sp>
+      <p:sp>
+        <p:nvSpPr>
+          <p:cNvPr id="3" name="Content Placeholder 2"/>
+          <p:cNvSpPr>
+            <a:spLocks noGrp="1"/>
+          </p:cNvSpPr>
+          <p:nvPr>
+            <p:ph idx="1"/>
+          </p:nvPr>
+        </p:nvSpPr>
+        <p:spPr/>
+        <p:txBody>
+          <a:bodyPr/>
+          <a:lstStyle/>
+          <a:p>
+            <a:r>
+              <a:rPr lang="en-US" dirty="0" err="1" smtClean="0"/>
+              <a:t>StringBuilder</a:t>
+            </a:r>
+            <a:r>
+              <a:rPr lang="en-US" dirty="0" smtClean="0"/>
+              <a:t> </a:t>
+            </a:r>
+            <a:r>
+              <a:rPr lang="en-US" dirty="0" smtClean="0"/>
+              <a:t>s = </a:t>
+            </a:r>
+            <a:r>
+              <a:rPr lang="en-US" b="1" dirty="0" smtClean="0"/>
+              <a:t>new </a:t>
+            </a:r>
+            <a:r>
+              <a:rPr lang="en-US" dirty="0" err="1" smtClean="0"/>
+              <a:t>StringBuilder</a:t>
+            </a:r>
+            <a:r>
+              <a:rPr lang="en-US" dirty="0" smtClean="0"/>
+              <a:t>();</a:t>
+            </a:r>
+            <a:endParaRPr lang="en-US" dirty="0" smtClean="0"/>
+          </a:p>
+          <a:p>
+            <a:r>
+              <a:rPr lang="en-US" dirty="0" err="1" smtClean="0"/>
+              <a:t>StringBuilder</a:t>
+            </a:r>
+            <a:r>
+              <a:rPr lang="en-US" dirty="0" smtClean="0"/>
+              <a:t> </a:t>
+            </a:r>
+            <a:r>
+              <a:rPr lang="en-US" dirty="0" smtClean="0"/>
+              <a:t>s = </a:t>
+            </a:r>
+            <a:r>
+              <a:rPr lang="en-US" b="1" dirty="0" smtClean="0"/>
+              <a:t>new </a:t>
+            </a:r>
+            <a:r>
+              <a:rPr lang="en-US" dirty="0" err="1" smtClean="0"/>
+              <a:t>StringBuilder</a:t>
+            </a:r>
+            <a:r>
+              <a:rPr lang="en-US" dirty="0" smtClean="0"/>
+              <a:t>(20</a:t>
+            </a:r>
+            <a:r>
+              <a:rPr lang="en-US" dirty="0" smtClean="0"/>
+              <a:t>);//Set a buffer of 20</a:t>
+            </a:r>
+          </a:p>
+          <a:p>
+            <a:endParaRPr lang="en-US" dirty="0"/>
+          </a:p>
+        </p:txBody>
+      </p:sp>
+    </p:spTree>
+  </p:cSld>
+  <p:clrMapOvr>
+    <a:masterClrMapping/>
+  </p:clrMapOvr>
+</p:sld>
+</file>
+
+<file path=ppt/slides/slide11.xml><?xml version="1.0" encoding="utf-8"?>
+<p:sld xmlns:a="http://schemas.openxmlformats.org/drawingml/2006/main" xmlns:r="http://schemas.openxmlformats.org/officeDocument/2006/relationships" xmlns:p="http://schemas.openxmlformats.org/presentationml/2006/main">
+  <p:cSld>
+    <p:spTree>
+      <p:nvGrpSpPr>
+        <p:cNvPr id="1" name=""/>
+        <p:cNvGrpSpPr/>
+        <p:nvPr/>
+      </p:nvGrpSpPr>
+      <p:grpSpPr>
+        <a:xfrm>
+          <a:off x="0" y="0"/>
+          <a:ext cx="0" cy="0"/>
+          <a:chOff x="0" y="0"/>
+          <a:chExt cx="0" cy="0"/>
+        </a:xfrm>
+      </p:grpSpPr>
+      <p:sp>
+        <p:nvSpPr>
+          <p:cNvPr id="2" name="Title 1"/>
+          <p:cNvSpPr>
+            <a:spLocks noGrp="1"/>
+          </p:cNvSpPr>
+          <p:nvPr>
+            <p:ph type="title"/>
+          </p:nvPr>
+        </p:nvSpPr>
+        <p:spPr/>
+        <p:txBody>
+          <a:bodyPr/>
+          <a:lstStyle/>
+          <a:p>
+            <a:endParaRPr lang="en-US"/>
+          </a:p>
+        </p:txBody>
+      </p:sp>
+      <p:sp>
+        <p:nvSpPr>
+          <p:cNvPr id="3" name="Content Placeholder 2"/>
+          <p:cNvSpPr>
+            <a:spLocks noGrp="1"/>
+          </p:cNvSpPr>
+          <p:nvPr>
+            <p:ph idx="1"/>
+          </p:nvPr>
+        </p:nvSpPr>
+        <p:spPr/>
+        <p:txBody>
+          <a:bodyPr/>
+          <a:lstStyle/>
+          <a:p>
+            <a:r>
+              <a:rPr lang="en-US" dirty="0" smtClean="0"/>
+              <a:t>String is immutable whereas </a:t>
+            </a:r>
+            <a:r>
+              <a:rPr lang="en-US" dirty="0" err="1" smtClean="0"/>
+              <a:t>StringBuffer</a:t>
+            </a:r>
+            <a:r>
+              <a:rPr lang="en-US" dirty="0" smtClean="0"/>
+              <a:t> and </a:t>
+            </a:r>
+            <a:r>
+              <a:rPr lang="en-US" dirty="0" err="1" smtClean="0"/>
+              <a:t>StringBuilder</a:t>
+            </a:r>
+            <a:r>
+              <a:rPr lang="en-US" dirty="0" smtClean="0"/>
+              <a:t> are mutable classes.</a:t>
+            </a:r>
+          </a:p>
+          <a:p>
+            <a:r>
+              <a:rPr lang="en-US" dirty="0" err="1" smtClean="0"/>
+              <a:t>StringBuffer</a:t>
+            </a:r>
+            <a:r>
+              <a:rPr lang="en-US" dirty="0" smtClean="0"/>
+              <a:t> is thread-safe and synchronized whereas </a:t>
+            </a:r>
+            <a:r>
+              <a:rPr lang="en-US" dirty="0" err="1" smtClean="0"/>
+              <a:t>StringBuilder</a:t>
+            </a:r>
+            <a:r>
+              <a:rPr lang="en-US" dirty="0" smtClean="0"/>
+              <a:t> is not. That’s why </a:t>
+            </a:r>
+            <a:r>
+              <a:rPr lang="en-US" dirty="0" err="1" smtClean="0"/>
+              <a:t>StringBuilder</a:t>
+            </a:r>
+            <a:r>
+              <a:rPr lang="en-US" dirty="0" smtClean="0"/>
+              <a:t> is faster than </a:t>
+            </a:r>
+            <a:r>
+              <a:rPr lang="en-US" dirty="0" err="1" smtClean="0"/>
+              <a:t>StringBuffer</a:t>
+            </a:r>
+            <a:r>
+              <a:rPr lang="en-US" dirty="0" smtClean="0"/>
+              <a:t>.</a:t>
+            </a:r>
+          </a:p>
+          <a:p>
+            <a:endParaRPr lang="en-US" dirty="0"/>
+          </a:p>
+        </p:txBody>
+      </p:sp>
+    </p:spTree>
+  </p:cSld>
+  <p:clrMapOvr>
+    <a:masterClrMapping/>
+  </p:clrMapOvr>
+</p:sld>
+</file>
+
 <file path=ppt/slides/slide2.xml><?xml version="1.0" encoding="utf-8"?>
 <p:sld xmlns:a="http://schemas.openxmlformats.org/drawingml/2006/main" xmlns:r="http://schemas.openxmlformats.org/officeDocument/2006/relationships" xmlns:p="http://schemas.openxmlformats.org/presentationml/2006/main">
   <p:cSld>
@@ -4016,7 +4257,69 @@
           <a:bodyPr/>
           <a:lstStyle/>
           <a:p>
-            <a:endParaRPr lang="en-US"/>
+            <a:r>
+              <a:rPr lang="en-US" dirty="0" smtClean="0"/>
+              <a:t>Java </a:t>
+            </a:r>
+            <a:r>
+              <a:rPr lang="en-US" dirty="0" err="1" smtClean="0"/>
+              <a:t>StringBuffer</a:t>
+            </a:r>
+            <a:r>
+              <a:rPr lang="en-US" dirty="0" smtClean="0"/>
+              <a:t> class is used to create mutable (modifiable) String </a:t>
+            </a:r>
+            <a:r>
+              <a:rPr lang="en-US" dirty="0" smtClean="0"/>
+              <a:t>objects</a:t>
+            </a:r>
+          </a:p>
+          <a:p>
+            <a:r>
+              <a:rPr lang="en-US" dirty="0" smtClean="0"/>
+              <a:t>String buffers are safe for use by multiple </a:t>
+            </a:r>
+            <a:r>
+              <a:rPr lang="en-US" dirty="0" smtClean="0"/>
+              <a:t>threads(Synchronized)</a:t>
+            </a:r>
+          </a:p>
+          <a:p>
+            <a:r>
+              <a:rPr lang="en-US" dirty="0" err="1" smtClean="0"/>
+              <a:t>java.lang.StringBuffer</a:t>
+            </a:r>
+            <a:r>
+              <a:rPr lang="en-US" dirty="0" smtClean="0"/>
+              <a:t> </a:t>
+            </a:r>
+            <a:r>
+              <a:rPr lang="en-US" dirty="0" smtClean="0"/>
+              <a:t>extends (or inherits from) object </a:t>
+            </a:r>
+            <a:r>
+              <a:rPr lang="en-US" dirty="0" smtClean="0"/>
+              <a:t>class</a:t>
+            </a:r>
+          </a:p>
+          <a:p>
+            <a:r>
+              <a:rPr lang="en-US" dirty="0" err="1" smtClean="0"/>
+              <a:t>StringBuffer</a:t>
+            </a:r>
+            <a:r>
+              <a:rPr lang="en-US" dirty="0" smtClean="0"/>
+              <a:t> was introduced in Java 1.0</a:t>
+            </a:r>
+          </a:p>
+          <a:p>
+            <a:endParaRPr lang="en-US" dirty="0" smtClean="0"/>
+          </a:p>
+          <a:p>
+            <a:endParaRPr lang="en-US" dirty="0" smtClean="0"/>
+          </a:p>
+          <a:p>
+            <a:endParaRPr lang="en-US" dirty="0"/>
           </a:p>
         </p:txBody>
       </p:sp>
@@ -4119,19 +4422,7 @@
             </a:r>
             <a:r>
               <a:rPr lang="en-US" dirty="0" smtClean="0"/>
-              <a:t>(20</a:t>
-            </a:r>
-            <a:r>
-              <a:rPr lang="en-US" dirty="0" smtClean="0"/>
-              <a:t>);//</a:t>
-            </a:r>
-            <a:r>
-              <a:rPr lang="en-US" smtClean="0"/>
-              <a:t>Set a buffer </a:t>
-            </a:r>
-            <a:r>
-              <a:rPr lang="en-US" dirty="0" smtClean="0"/>
-              <a:t>of 20</a:t>
+              <a:t>(20);//Set a buffer of 20</a:t>
             </a:r>
             <a:endParaRPr lang="en-US" dirty="0"/>
           </a:p>
@@ -4202,7 +4493,7 @@
           <a:p>
             <a:r>
               <a:rPr lang="en-US" dirty="0" err="1" smtClean="0"/>
-              <a:t>java.lang.StringBuffer</a:t>
+              <a:t>java.lang.StringBuilder</a:t>
             </a:r>
             <a:r>
               <a:rPr lang="en-US" dirty="0" smtClean="0"/>
@@ -4210,17 +4501,39 @@
             </a:r>
             <a:r>
               <a:rPr lang="en-US" dirty="0" smtClean="0"/>
-              <a:t>extends (or inherits from) </a:t>
-            </a:r>
-            <a:r>
-              <a:rPr lang="en-US" dirty="0" smtClean="0"/>
-              <a:t>object class</a:t>
-            </a:r>
-          </a:p>
-          <a:p>
-            <a:r>
-              <a:rPr lang="en-US" dirty="0" smtClean="0"/>
-              <a:t>String buffers are safe for use by multiple threads</a:t>
+              <a:t>extends (or inherits from) object class</a:t>
+            </a:r>
+          </a:p>
+          <a:p>
+            <a:r>
+              <a:rPr lang="en-US" dirty="0" smtClean="0"/>
+              <a:t>String buffers are </a:t>
+            </a:r>
+            <a:r>
+              <a:rPr lang="en-US" dirty="0" smtClean="0"/>
+              <a:t>not </a:t>
+            </a:r>
+            <a:r>
+              <a:rPr lang="en-US" dirty="0" smtClean="0"/>
+              <a:t>safe </a:t>
+            </a:r>
+            <a:r>
+              <a:rPr lang="en-US" dirty="0" smtClean="0"/>
+              <a:t>for use by multiple </a:t>
+            </a:r>
+            <a:r>
+              <a:rPr lang="en-US" dirty="0" smtClean="0"/>
+              <a:t>threads(Not synchronized)</a:t>
+            </a:r>
+          </a:p>
+          <a:p>
+            <a:r>
+              <a:rPr lang="en-US" dirty="0" err="1" smtClean="0"/>
+              <a:t>StringBuilder</a:t>
+            </a:r>
+            <a:r>
+              <a:rPr lang="en-US" dirty="0" smtClean="0"/>
+              <a:t> was introduced in Java 1.5</a:t>
             </a:r>
             <a:endParaRPr lang="en-US" dirty="0"/>
           </a:p>

</xml_diff>

<commit_message>
string string buffer, builder and utils
</commit_message>
<xml_diff>
--- a/PowerPoints/Modue_4/String_StringBuffer_StringBuilder.pptx
+++ b/PowerPoints/Modue_4/String_StringBuffer_StringBuilder.pptx
@@ -16,6 +16,7 @@
     <p:sldId id="264" r:id="rId10"/>
     <p:sldId id="268" r:id="rId11"/>
     <p:sldId id="267" r:id="rId12"/>
+    <p:sldId id="269" r:id="rId13"/>
   </p:sldIdLst>
   <p:sldSz cx="9144000" cy="6858000" type="screen4x3"/>
   <p:notesSz cx="6858000" cy="9144000"/>
@@ -3401,6 +3402,81 @@
             </a:r>
           </a:p>
           <a:p>
+            <a:endParaRPr lang="en-US" dirty="0"/>
+          </a:p>
+        </p:txBody>
+      </p:sp>
+    </p:spTree>
+  </p:cSld>
+  <p:clrMapOvr>
+    <a:masterClrMapping/>
+  </p:clrMapOvr>
+</p:sld>
+</file>
+
+<file path=ppt/slides/slide12.xml><?xml version="1.0" encoding="utf-8"?>
+<p:sld xmlns:a="http://schemas.openxmlformats.org/drawingml/2006/main" xmlns:r="http://schemas.openxmlformats.org/officeDocument/2006/relationships" xmlns:p="http://schemas.openxmlformats.org/presentationml/2006/main">
+  <p:cSld>
+    <p:spTree>
+      <p:nvGrpSpPr>
+        <p:cNvPr id="1" name=""/>
+        <p:cNvGrpSpPr/>
+        <p:nvPr/>
+      </p:nvGrpSpPr>
+      <p:grpSpPr>
+        <a:xfrm>
+          <a:off x="0" y="0"/>
+          <a:ext cx="0" cy="0"/>
+          <a:chOff x="0" y="0"/>
+          <a:chExt cx="0" cy="0"/>
+        </a:xfrm>
+      </p:grpSpPr>
+      <p:sp>
+        <p:nvSpPr>
+          <p:cNvPr id="2" name="Title 1"/>
+          <p:cNvSpPr>
+            <a:spLocks noGrp="1"/>
+          </p:cNvSpPr>
+          <p:nvPr>
+            <p:ph type="title"/>
+          </p:nvPr>
+        </p:nvSpPr>
+        <p:spPr/>
+        <p:txBody>
+          <a:bodyPr/>
+          <a:lstStyle/>
+          <a:p>
+            <a:r>
+              <a:rPr lang="en-US" dirty="0" err="1" smtClean="0"/>
+              <a:t>StringUtils</a:t>
+            </a:r>
+            <a:r>
+              <a:rPr lang="en-US" dirty="0" smtClean="0"/>
+              <a:t> from Apache</a:t>
+            </a:r>
+            <a:endParaRPr lang="en-US" dirty="0"/>
+          </a:p>
+        </p:txBody>
+      </p:sp>
+      <p:sp>
+        <p:nvSpPr>
+          <p:cNvPr id="3" name="Content Placeholder 2"/>
+          <p:cNvSpPr>
+            <a:spLocks noGrp="1"/>
+          </p:cNvSpPr>
+          <p:nvPr>
+            <p:ph idx="1"/>
+          </p:nvPr>
+        </p:nvSpPr>
+        <p:spPr/>
+        <p:txBody>
+          <a:bodyPr/>
+          <a:lstStyle/>
+          <a:p>
+            <a:r>
+              <a:rPr lang="en-US" b="1" dirty="0" smtClean="0"/>
+              <a:t>import org.apache.commons.lang3.StringUtils;</a:t>
+            </a:r>
             <a:endParaRPr lang="en-US" dirty="0"/>
           </a:p>
         </p:txBody>

</xml_diff>